<commit_message>
Präsentation Problem beim Pushen
</commit_message>
<xml_diff>
--- a/4_Presentation/Präsentation Gruppe 2.pptx
+++ b/4_Presentation/Präsentation Gruppe 2.pptx
@@ -4138,12 +4138,21 @@
         </p:nvSpPr>
         <p:spPr/>
         <p:txBody>
-          <a:bodyPr/>
+          <a:bodyPr>
+            <a:normAutofit lnSpcReduction="10000"/>
+          </a:bodyPr>
           <a:lstStyle/>
           <a:p>
             <a:r>
               <a:rPr lang="de-DE" dirty="0"/>
-              <a:t> Einführung in Data Science und maschinelles Lernen –</a:t>
+              <a:t> Einführung in Data Science und maschinelles Lernen </a:t>
+            </a:r>
+            <a:br>
+              <a:rPr lang="de-DE" dirty="0"/>
+            </a:br>
+            <a:r>
+              <a:rPr lang="de-DE" dirty="0"/>
+              <a:t>–</a:t>
             </a:r>
             <a:br>
               <a:rPr lang="de-DE" dirty="0"/>

</xml_diff>